<commit_message>
updating cog aging poster
</commit_message>
<xml_diff>
--- a/5 Presentations/Posters/Namias Maxwell Huff Cog Aging 2022 (3_20_22).pptx
+++ b/5 Presentations/Posters/Namias Maxwell Huff Cog Aging 2022 (3_20_22).pptx
@@ -4099,7 +4099,31 @@
                 <a:cs typeface="Calibri"/>
                 <a:sym typeface="Calibri"/>
               </a:rPr>
-              <a:t>. In addition to assessing changes in mean errors and RTs, we assessed RT distributional differences in switch costs using Vincentile plots and ex-Gaussian parameters. We predicted greater task difficulty with random switching and this difficulty would be reflected in greater error rates and RTs versus alternating runs. Given breakdowns in working memory and control processes characteristic of cognitive impairment, we expected that MCI older adults would particularly struggle with random switching which would be reflected in greater switch costs in random switching versus alternating runs. </a:t>
+              <a:t>. In addition to assessing changes in mean errors and RTs, we assessed RT distributional differences in switch costs using Vincentile plots and ex-Gaussian parameters. We predicted greater task difficulty with random switching and this difficulty would be reflected in greater error rates and RTs versus alternating runs. Given breakdowns in working memory and control processes characteristic of cognitive impairment, we expected that MCI older adults would particularly struggle with random switching which would be reflected in greater switch costs in random </a:t>
+            </a:r>
+            <a:r>
+              <a:rPr lang="en-US" sz="3100">
+                <a:solidFill>
+                  <a:srgbClr val="000090"/>
+                </a:solidFill>
+                <a:latin typeface="Calibri"/>
+                <a:ea typeface="Calibri"/>
+                <a:cs typeface="Calibri"/>
+                <a:sym typeface="Calibri"/>
+              </a:rPr>
+              <a:t>switching vs. </a:t>
+            </a:r>
+            <a:r>
+              <a:rPr lang="en-US" sz="3100" dirty="0">
+                <a:solidFill>
+                  <a:srgbClr val="000090"/>
+                </a:solidFill>
+                <a:latin typeface="Calibri"/>
+                <a:ea typeface="Calibri"/>
+                <a:cs typeface="Calibri"/>
+                <a:sym typeface="Calibri"/>
+              </a:rPr>
+              <a:t>alternating runs. </a:t>
             </a:r>
           </a:p>
         </p:txBody>
@@ -4164,8 +4188,8 @@
         </p:nvSpPr>
         <p:spPr bwMode="auto">
           <a:xfrm>
-            <a:off x="27453882" y="17983200"/>
-            <a:ext cx="14608518" cy="11177003"/>
+            <a:off x="27453882" y="18007597"/>
+            <a:ext cx="14409729" cy="11177003"/>
           </a:xfrm>
           <a:prstGeom prst="rect">
             <a:avLst/>
@@ -4195,7 +4219,7 @@
                 <a:latin typeface="Calibri"/>
                 <a:cs typeface="Calibri"/>
               </a:rPr>
-              <a:t>MCI older adults produced more errors versus younger and healthy older adults. Both older adult groups had slower RTs versus younger adults across trial types. However, within each group, few differences were found between alternating runs and random switching regarding errors and RTs. Regarding switch costs, global error costs did not differ between switch types across groups. For local error costs, MCI older adult switch costs were greater for alternating runs than random switching. Finally, for mean RT switch costs, global costs did not differ as function of switch pattern. However, younger and healthy older adults showed greater local RT costs when switching was random, suggesting that the random switch task was more taxing towards task-set reconfiguration processes. This pattern did not extend to MCI older adults, suggesting that they were not well tuned to the switch task.</a:t>
+              <a:t>Overall, MCI older adults produced more errors vs. younger and healthy older adults. Both older adult groups had slower RTs comparted to younger adults across trial types. However, within each group, few differences were found between alternating runs and random switching regarding errors and RTs. Regarding switch costs, global error costs did not differ between switch types across groups. For local error costs, MCI older adult switch costs were greater for alternating runs than random switching. Finally, for mean RT switch costs, global costs did not differ as function of switch pattern. However, younger and healthy older adults showed greater local RT costs when switching was random, suggesting that the random switch task was more taxing towards task-set reconfiguration processes. This pattern did not extend to MCI older adults, suggesting that they were not well tuned to the switch task.</a:t>
             </a:r>
           </a:p>
           <a:p>
@@ -4339,17 +4363,7 @@
                 <a:latin typeface="Calibri" panose="020F0502020204030204" pitchFamily="34" charset="0"/>
                 <a:ea typeface="Times New Roman" panose="02020603050405020304" pitchFamily="18" charset="0"/>
               </a:rPr>
-              <a:t>Instead, it appears that simply having individuals engage in predictive task-switching is sufficient to produce errors and slow responding, and that these declines in performance primarily increase as a function of age/health rather than </a:t>
-            </a:r>
-            <a:r>
-              <a:rPr lang="en-US" sz="3100">
-                <a:solidFill>
-                  <a:srgbClr val="000090"/>
-                </a:solidFill>
-                <a:latin typeface="Calibri" panose="020F0502020204030204" pitchFamily="34" charset="0"/>
-                <a:ea typeface="Times New Roman" panose="02020603050405020304" pitchFamily="18" charset="0"/>
-              </a:rPr>
-              <a:t>task difficulty.</a:t>
+              <a:t>Instead, it appears that simply having individuals engage in predictive task-switching is sufficient to produce errors and slow responding, and that these declines in performance primarily increase as a function of age/health rather than switch-task difficulty.</a:t>
             </a:r>
             <a:endParaRPr lang="en-US" sz="3100" dirty="0">
               <a:solidFill>
@@ -7791,7 +7805,7 @@
         </p:nvSpPr>
         <p:spPr bwMode="auto">
           <a:xfrm>
-            <a:off x="30031266" y="17318572"/>
+            <a:off x="30031266" y="17297400"/>
             <a:ext cx="9372600" cy="1415772"/>
           </a:xfrm>
           <a:prstGeom prst="rect">
@@ -7820,11 +7834,6 @@
               </a:rPr>
               <a:t>Conclusions</a:t>
             </a:r>
-            <a:endParaRPr lang="en-US" sz="4600" b="1" dirty="0">
-              <a:solidFill>
-                <a:srgbClr val="0000FF"/>
-              </a:solidFill>
-            </a:endParaRPr>
           </a:p>
           <a:p>
             <a:pPr algn="ctr" defTabSz="1347788" eaLnBrk="0" hangingPunct="0"/>

</xml_diff>